<commit_message>
Final Update 28  November 2024
I have finished all sections to this capstone project
</commit_message>
<xml_diff>
--- a/Poster Rodney Wardle Capstone Project.pptx
+++ b/Poster Rodney Wardle Capstone Project.pptx
@@ -256,7 +256,7 @@
             <a:fld id="{0158C5BC-9A70-462C-B28D-9600239EAC64}" type="datetimeFigureOut">
               <a:rPr lang="en-US" smtClean="0"/>
               <a:pPr/>
-              <a:t>11/18/2024</a:t>
+              <a:t>11/28/2024</a:t>
             </a:fld>
             <a:endParaRPr lang="en-US"/>
           </a:p>
@@ -423,7 +423,7 @@
             <a:fld id="{E6CC2317-6751-4CD4-9995-8782DD78E936}" type="datetimeFigureOut">
               <a:rPr lang="en-US" smtClean="0"/>
               <a:pPr/>
-              <a:t>11/18/2024</a:t>
+              <a:t>11/28/2024</a:t>
             </a:fld>
             <a:endParaRPr lang="en-US" dirty="0"/>
           </a:p>
@@ -7754,257 +7754,6 @@
           </a:p>
         </p:txBody>
       </p:sp>
-      <p:graphicFrame>
-        <p:nvGraphicFramePr>
-          <p:cNvPr id="27" name="Table 26">
-            <a:extLst>
-              <a:ext uri="{FF2B5EF4-FFF2-40B4-BE49-F238E27FC236}">
-                <a16:creationId xmlns:a16="http://schemas.microsoft.com/office/drawing/2014/main" id="{9885C08F-C755-1925-0F6A-4EC05B7F1EA2}"/>
-              </a:ext>
-            </a:extLst>
-          </p:cNvPr>
-          <p:cNvGraphicFramePr>
-            <a:graphicFrameLocks noGrp="1"/>
-          </p:cNvGraphicFramePr>
-          <p:nvPr>
-            <p:extLst>
-              <p:ext uri="{D42A27DB-BD31-4B8C-83A1-F6EECF244321}">
-                <p14:modId xmlns:p14="http://schemas.microsoft.com/office/powerpoint/2010/main" val="3579742875"/>
-              </p:ext>
-            </p:extLst>
-          </p:nvPr>
-        </p:nvGraphicFramePr>
-        <p:xfrm>
-          <a:off x="188623" y="25185308"/>
-          <a:ext cx="19847983" cy="2309848"/>
-        </p:xfrm>
-        <a:graphic>
-          <a:graphicData uri="http://schemas.openxmlformats.org/drawingml/2006/table">
-            <a:tbl>
-              <a:tblPr firstRow="1" bandRow="1">
-                <a:tableStyleId>{5C22544A-7EE6-4342-B048-85BDC9FD1C3A}</a:tableStyleId>
-              </a:tblPr>
-              <a:tblGrid>
-                <a:gridCol w="3469831">
-                  <a:extLst>
-                    <a:ext uri="{9D8B030D-6E8A-4147-A177-3AD203B41FA5}">
-                      <a16:colId xmlns:a16="http://schemas.microsoft.com/office/drawing/2014/main" val="310761005"/>
-                    </a:ext>
-                  </a:extLst>
-                </a:gridCol>
-                <a:gridCol w="5795792">
-                  <a:extLst>
-                    <a:ext uri="{9D8B030D-6E8A-4147-A177-3AD203B41FA5}">
-                      <a16:colId xmlns:a16="http://schemas.microsoft.com/office/drawing/2014/main" val="1066632894"/>
-                    </a:ext>
-                  </a:extLst>
-                </a:gridCol>
-                <a:gridCol w="5497027">
-                  <a:extLst>
-                    <a:ext uri="{9D8B030D-6E8A-4147-A177-3AD203B41FA5}">
-                      <a16:colId xmlns:a16="http://schemas.microsoft.com/office/drawing/2014/main" val="3232168232"/>
-                    </a:ext>
-                  </a:extLst>
-                </a:gridCol>
-                <a:gridCol w="5085333">
-                  <a:extLst>
-                    <a:ext uri="{9D8B030D-6E8A-4147-A177-3AD203B41FA5}">
-                      <a16:colId xmlns:a16="http://schemas.microsoft.com/office/drawing/2014/main" val="106266608"/>
-                    </a:ext>
-                  </a:extLst>
-                </a:gridCol>
-              </a:tblGrid>
-              <a:tr h="785848">
-                <a:tc>
-                  <a:txBody>
-                    <a:bodyPr/>
-                    <a:lstStyle/>
-                    <a:p>
-                      <a:r>
-                        <a:rPr lang="en-US" sz="4400" dirty="0"/>
-                        <a:t>Model</a:t>
-                      </a:r>
-                      <a:endParaRPr lang="en-GB" sz="4400" dirty="0"/>
-                    </a:p>
-                  </a:txBody>
-                  <a:tcPr/>
-                </a:tc>
-                <a:tc>
-                  <a:txBody>
-                    <a:bodyPr/>
-                    <a:lstStyle/>
-                    <a:p>
-                      <a:r>
-                        <a:rPr lang="en-US" sz="4400" dirty="0"/>
-                        <a:t>Precision </a:t>
-                      </a:r>
-                    </a:p>
-                  </a:txBody>
-                  <a:tcPr/>
-                </a:tc>
-                <a:tc>
-                  <a:txBody>
-                    <a:bodyPr/>
-                    <a:lstStyle/>
-                    <a:p>
-                      <a:r>
-                        <a:rPr lang="en-US" sz="4400" dirty="0"/>
-                        <a:t>Recall</a:t>
-                      </a:r>
-                      <a:endParaRPr lang="en-GB" sz="4400" dirty="0"/>
-                    </a:p>
-                  </a:txBody>
-                  <a:tcPr/>
-                </a:tc>
-                <a:tc>
-                  <a:txBody>
-                    <a:bodyPr/>
-                    <a:lstStyle/>
-                    <a:p>
-                      <a:r>
-                        <a:rPr lang="en-US" sz="4400" dirty="0"/>
-                        <a:t>F1 Score</a:t>
-                      </a:r>
-                      <a:endParaRPr lang="en-GB" sz="4400" dirty="0"/>
-                    </a:p>
-                  </a:txBody>
-                  <a:tcPr/>
-                </a:tc>
-                <a:extLst>
-                  <a:ext uri="{0D108BD9-81ED-4DB2-BD59-A6C34878D82A}">
-                    <a16:rowId xmlns:a16="http://schemas.microsoft.com/office/drawing/2014/main" val="1355483385"/>
-                  </a:ext>
-                </a:extLst>
-              </a:tr>
-              <a:tr h="370840">
-                <a:tc>
-                  <a:txBody>
-                    <a:bodyPr/>
-                    <a:lstStyle/>
-                    <a:p>
-                      <a:r>
-                        <a:rPr lang="en-US" sz="4400" dirty="0"/>
-                        <a:t>Decision Tree </a:t>
-                      </a:r>
-                      <a:endParaRPr lang="en-GB" sz="4400" dirty="0"/>
-                    </a:p>
-                  </a:txBody>
-                  <a:tcPr/>
-                </a:tc>
-                <a:tc>
-                  <a:txBody>
-                    <a:bodyPr/>
-                    <a:lstStyle/>
-                    <a:p>
-                      <a:r>
-                        <a:rPr lang="en-GB" sz="4400" dirty="0"/>
-                        <a:t>0.24</a:t>
-                      </a:r>
-                      <a:endParaRPr lang="en-US" sz="4400" dirty="0"/>
-                    </a:p>
-                  </a:txBody>
-                  <a:tcPr/>
-                </a:tc>
-                <a:tc>
-                  <a:txBody>
-                    <a:bodyPr/>
-                    <a:lstStyle/>
-                    <a:p>
-                      <a:r>
-                        <a:rPr lang="en-US" sz="4400" dirty="0"/>
-                        <a:t>0.93</a:t>
-                      </a:r>
-                      <a:endParaRPr lang="en-GB" sz="4400" dirty="0"/>
-                    </a:p>
-                  </a:txBody>
-                  <a:tcPr/>
-                </a:tc>
-                <a:tc>
-                  <a:txBody>
-                    <a:bodyPr/>
-                    <a:lstStyle/>
-                    <a:p>
-                      <a:r>
-                        <a:rPr lang="en-US" sz="4400" dirty="0"/>
-                        <a:t>0.39</a:t>
-                      </a:r>
-                      <a:endParaRPr lang="en-GB" sz="4400" dirty="0"/>
-                    </a:p>
-                  </a:txBody>
-                  <a:tcPr/>
-                </a:tc>
-                <a:extLst>
-                  <a:ext uri="{0D108BD9-81ED-4DB2-BD59-A6C34878D82A}">
-                    <a16:rowId xmlns:a16="http://schemas.microsoft.com/office/drawing/2014/main" val="514958850"/>
-                  </a:ext>
-                </a:extLst>
-              </a:tr>
-              <a:tr h="0">
-                <a:tc>
-                  <a:txBody>
-                    <a:bodyPr/>
-                    <a:lstStyle/>
-                    <a:p>
-                      <a:r>
-                        <a:rPr lang="en-US" sz="4400" dirty="0"/>
-                        <a:t>KNN</a:t>
-                      </a:r>
-                    </a:p>
-                  </a:txBody>
-                  <a:tcPr/>
-                </a:tc>
-                <a:tc>
-                  <a:txBody>
-                    <a:bodyPr/>
-                    <a:lstStyle/>
-                    <a:p>
-                      <a:r>
-                        <a:rPr lang="en-US" sz="4400" dirty="0"/>
-                        <a:t>0.21</a:t>
-                      </a:r>
-                      <a:endParaRPr lang="en-GB" sz="4400" dirty="0"/>
-                    </a:p>
-                  </a:txBody>
-                  <a:tcPr/>
-                </a:tc>
-                <a:tc>
-                  <a:txBody>
-                    <a:bodyPr/>
-                    <a:lstStyle/>
-                    <a:p>
-                      <a:r>
-                        <a:rPr lang="en-US" sz="4400" dirty="0"/>
-                        <a:t>0.87</a:t>
-                      </a:r>
-                      <a:endParaRPr lang="en-GB" sz="4400" dirty="0"/>
-                    </a:p>
-                  </a:txBody>
-                  <a:tcPr/>
-                </a:tc>
-                <a:tc>
-                  <a:txBody>
-                    <a:bodyPr/>
-                    <a:lstStyle/>
-                    <a:p>
-                      <a:r>
-                        <a:rPr lang="en-US" sz="4400" dirty="0"/>
-                        <a:t>0.46</a:t>
-                      </a:r>
-                      <a:endParaRPr lang="en-GB" sz="4400" dirty="0"/>
-                    </a:p>
-                  </a:txBody>
-                  <a:tcPr/>
-                </a:tc>
-                <a:extLst>
-                  <a:ext uri="{0D108BD9-81ED-4DB2-BD59-A6C34878D82A}">
-                    <a16:rowId xmlns:a16="http://schemas.microsoft.com/office/drawing/2014/main" val="1629505754"/>
-                  </a:ext>
-                </a:extLst>
-              </a:tr>
-            </a:tbl>
-          </a:graphicData>
-        </a:graphic>
-      </p:graphicFrame>
       <p:pic>
         <p:nvPicPr>
           <p:cNvPr id="19" name="Picture 18" descr="A purple bar graph with numbers&#10;&#10;Description automatically generated">
@@ -8077,158 +7826,321 @@
           </a:prstGeom>
         </p:spPr>
       </p:pic>
-      <p:sp>
-        <p:nvSpPr>
-          <p:cNvPr id="20" name="TextBox 19">
+      <p:graphicFrame>
+        <p:nvGraphicFramePr>
+          <p:cNvPr id="18" name="Table 17">
             <a:extLst>
               <a:ext uri="{FF2B5EF4-FFF2-40B4-BE49-F238E27FC236}">
-                <a16:creationId xmlns:a16="http://schemas.microsoft.com/office/drawing/2014/main" id="{B6D892C2-ABE3-4980-C8DC-011957114F81}"/>
+                <a16:creationId xmlns:a16="http://schemas.microsoft.com/office/drawing/2014/main" id="{D435E1A3-E650-334F-2AA8-BEE7F3DCCB0D}"/>
               </a:ext>
             </a:extLst>
           </p:cNvPr>
-          <p:cNvSpPr txBox="1"/>
-          <p:nvPr/>
-        </p:nvSpPr>
-        <p:spPr>
-          <a:xfrm>
-            <a:off x="38084" y="28207118"/>
-            <a:ext cx="19998522" cy="1815882"/>
-          </a:xfrm>
-          <a:prstGeom prst="rect">
-            <a:avLst/>
-          </a:prstGeom>
-          <a:noFill/>
-        </p:spPr>
-        <p:txBody>
-          <a:bodyPr wrap="square">
-            <a:spAutoFit/>
-          </a:bodyPr>
-          <a:lstStyle/>
-          <a:p>
-            <a:r>
-              <a:rPr lang="en-US" sz="2800" u="sng" dirty="0">
-                <a:solidFill>
-                  <a:schemeClr val="tx1"/>
-                </a:solidFill>
-                <a:latin typeface="+mn-lt"/>
-              </a:rPr>
-              <a:t>K Means clustering best model results:</a:t>
-            </a:r>
-          </a:p>
-          <a:p>
-            <a:endParaRPr lang="en-US" sz="2800" dirty="0"/>
-          </a:p>
-          <a:p>
-            <a:r>
-              <a:rPr lang="en-US" sz="2800" dirty="0">
-                <a:solidFill>
-                  <a:schemeClr val="tx1"/>
-                </a:solidFill>
-                <a:latin typeface="+mn-lt"/>
-              </a:rPr>
-              <a:t>Best hyperparameters found by </a:t>
-            </a:r>
-            <a:r>
-              <a:rPr lang="en-US" sz="2800" dirty="0" err="1">
-                <a:solidFill>
-                  <a:schemeClr val="tx1"/>
-                </a:solidFill>
-                <a:latin typeface="+mn-lt"/>
-              </a:rPr>
-              <a:t>GridSearchCV</a:t>
-            </a:r>
-            <a:r>
-              <a:rPr lang="en-US" sz="2800" dirty="0">
-                <a:solidFill>
-                  <a:schemeClr val="tx1"/>
-                </a:solidFill>
-                <a:latin typeface="+mn-lt"/>
-              </a:rPr>
-              <a:t>: {'</a:t>
-            </a:r>
-            <a:r>
-              <a:rPr lang="en-US" sz="2800" dirty="0" err="1">
-                <a:solidFill>
-                  <a:schemeClr val="tx1"/>
-                </a:solidFill>
-                <a:latin typeface="+mn-lt"/>
-              </a:rPr>
-              <a:t>init</a:t>
-            </a:r>
-            <a:r>
-              <a:rPr lang="en-US" sz="2800" dirty="0">
-                <a:solidFill>
-                  <a:schemeClr val="tx1"/>
-                </a:solidFill>
-                <a:latin typeface="+mn-lt"/>
-              </a:rPr>
-              <a:t>': 'random', '</a:t>
-            </a:r>
-            <a:r>
-              <a:rPr lang="en-US" sz="2800" dirty="0" err="1">
-                <a:solidFill>
-                  <a:schemeClr val="tx1"/>
-                </a:solidFill>
-                <a:latin typeface="+mn-lt"/>
-              </a:rPr>
-              <a:t>max_iter</a:t>
-            </a:r>
-            <a:r>
-              <a:rPr lang="en-US" sz="2800" dirty="0">
-                <a:solidFill>
-                  <a:schemeClr val="tx1"/>
-                </a:solidFill>
-                <a:latin typeface="+mn-lt"/>
-              </a:rPr>
-              <a:t>': 100, '</a:t>
-            </a:r>
-            <a:r>
-              <a:rPr lang="en-US" sz="2800" dirty="0" err="1">
-                <a:solidFill>
-                  <a:schemeClr val="tx1"/>
-                </a:solidFill>
-                <a:latin typeface="+mn-lt"/>
-              </a:rPr>
-              <a:t>n_clusters</a:t>
-            </a:r>
-            <a:r>
-              <a:rPr lang="en-US" sz="2800" dirty="0">
-                <a:solidFill>
-                  <a:schemeClr val="tx1"/>
-                </a:solidFill>
-                <a:latin typeface="+mn-lt"/>
-              </a:rPr>
-              <a:t>': 8, '</a:t>
-            </a:r>
-            <a:r>
-              <a:rPr lang="en-US" sz="2800" dirty="0" err="1">
-                <a:solidFill>
-                  <a:schemeClr val="tx1"/>
-                </a:solidFill>
-                <a:latin typeface="+mn-lt"/>
-              </a:rPr>
-              <a:t>n_init</a:t>
-            </a:r>
-            <a:r>
-              <a:rPr lang="en-US" sz="2800" dirty="0">
-                <a:solidFill>
-                  <a:schemeClr val="tx1"/>
-                </a:solidFill>
-                <a:latin typeface="+mn-lt"/>
-              </a:rPr>
-              <a:t>': 10}</a:t>
-            </a:r>
-          </a:p>
-          <a:p>
-            <a:endParaRPr lang="en-GB" sz="2800" dirty="0">
-              <a:solidFill>
-                <a:schemeClr val="tx1"/>
-              </a:solidFill>
-              <a:latin typeface="+mn-lt"/>
-            </a:endParaRPr>
-          </a:p>
-        </p:txBody>
-      </p:sp>
+          <p:cNvGraphicFramePr>
+            <a:graphicFrameLocks noGrp="1"/>
+          </p:cNvGraphicFramePr>
+          <p:nvPr>
+            <p:extLst>
+              <p:ext uri="{D42A27DB-BD31-4B8C-83A1-F6EECF244321}">
+                <p14:modId xmlns:p14="http://schemas.microsoft.com/office/powerpoint/2010/main" val="1928321950"/>
+              </p:ext>
+            </p:extLst>
+          </p:nvPr>
+        </p:nvGraphicFramePr>
+        <p:xfrm>
+          <a:off x="412966" y="26000982"/>
+          <a:ext cx="20493320" cy="3079974"/>
+        </p:xfrm>
+        <a:graphic>
+          <a:graphicData uri="http://schemas.openxmlformats.org/drawingml/2006/table">
+            <a:tbl>
+              <a:tblPr firstRow="1" bandRow="1">
+                <a:tableStyleId>{5C22544A-7EE6-4342-B048-85BDC9FD1C3A}</a:tableStyleId>
+              </a:tblPr>
+              <a:tblGrid>
+                <a:gridCol w="5123330">
+                  <a:extLst>
+                    <a:ext uri="{9D8B030D-6E8A-4147-A177-3AD203B41FA5}">
+                      <a16:colId xmlns:a16="http://schemas.microsoft.com/office/drawing/2014/main" val="3732998461"/>
+                    </a:ext>
+                  </a:extLst>
+                </a:gridCol>
+                <a:gridCol w="5123330">
+                  <a:extLst>
+                    <a:ext uri="{9D8B030D-6E8A-4147-A177-3AD203B41FA5}">
+                      <a16:colId xmlns:a16="http://schemas.microsoft.com/office/drawing/2014/main" val="3702302998"/>
+                    </a:ext>
+                  </a:extLst>
+                </a:gridCol>
+                <a:gridCol w="5123330">
+                  <a:extLst>
+                    <a:ext uri="{9D8B030D-6E8A-4147-A177-3AD203B41FA5}">
+                      <a16:colId xmlns:a16="http://schemas.microsoft.com/office/drawing/2014/main" val="4262083560"/>
+                    </a:ext>
+                  </a:extLst>
+                </a:gridCol>
+                <a:gridCol w="5123330">
+                  <a:extLst>
+                    <a:ext uri="{9D8B030D-6E8A-4147-A177-3AD203B41FA5}">
+                      <a16:colId xmlns:a16="http://schemas.microsoft.com/office/drawing/2014/main" val="3152618413"/>
+                    </a:ext>
+                  </a:extLst>
+                </a:gridCol>
+              </a:tblGrid>
+              <a:tr h="370840">
+                <a:tc>
+                  <a:txBody>
+                    <a:bodyPr/>
+                    <a:lstStyle/>
+                    <a:p>
+                      <a:r>
+                        <a:rPr lang="en-US" sz="4000" dirty="0"/>
+                        <a:t>Model</a:t>
+                      </a:r>
+                      <a:endParaRPr lang="en-GB" sz="4000" dirty="0"/>
+                    </a:p>
+                  </a:txBody>
+                  <a:tcPr/>
+                </a:tc>
+                <a:tc>
+                  <a:txBody>
+                    <a:bodyPr/>
+                    <a:lstStyle/>
+                    <a:p>
+                      <a:r>
+                        <a:rPr lang="en-US" sz="4000" dirty="0"/>
+                        <a:t>Precision </a:t>
+                      </a:r>
+                      <a:endParaRPr lang="en-GB" sz="4000" dirty="0"/>
+                    </a:p>
+                  </a:txBody>
+                  <a:tcPr/>
+                </a:tc>
+                <a:tc>
+                  <a:txBody>
+                    <a:bodyPr/>
+                    <a:lstStyle/>
+                    <a:p>
+                      <a:r>
+                        <a:rPr lang="en-US" sz="4000" dirty="0"/>
+                        <a:t>Recall</a:t>
+                      </a:r>
+                      <a:endParaRPr lang="en-GB" sz="4000" dirty="0"/>
+                    </a:p>
+                  </a:txBody>
+                  <a:tcPr/>
+                </a:tc>
+                <a:tc>
+                  <a:txBody>
+                    <a:bodyPr/>
+                    <a:lstStyle/>
+                    <a:p>
+                      <a:r>
+                        <a:rPr lang="en-US" sz="4000" dirty="0"/>
+                        <a:t>F1 Score</a:t>
+                      </a:r>
+                      <a:endParaRPr lang="en-GB" sz="4000" dirty="0"/>
+                    </a:p>
+                  </a:txBody>
+                  <a:tcPr/>
+                </a:tc>
+                <a:extLst>
+                  <a:ext uri="{0D108BD9-81ED-4DB2-BD59-A6C34878D82A}">
+                    <a16:rowId xmlns:a16="http://schemas.microsoft.com/office/drawing/2014/main" val="1976147054"/>
+                  </a:ext>
+                </a:extLst>
+              </a:tr>
+              <a:tr h="976854">
+                <a:tc>
+                  <a:txBody>
+                    <a:bodyPr/>
+                    <a:lstStyle/>
+                    <a:p>
+                      <a:r>
+                        <a:rPr lang="en-US" sz="4000" dirty="0"/>
+                        <a:t>Decision Tree</a:t>
+                      </a:r>
+                      <a:endParaRPr lang="en-GB" sz="4000" dirty="0"/>
+                    </a:p>
+                  </a:txBody>
+                  <a:tcPr/>
+                </a:tc>
+                <a:tc>
+                  <a:txBody>
+                    <a:bodyPr/>
+                    <a:lstStyle/>
+                    <a:p>
+                      <a:r>
+                        <a:rPr lang="en-US" sz="4000" dirty="0"/>
+                        <a:t>0.24</a:t>
+                      </a:r>
+                    </a:p>
+                  </a:txBody>
+                  <a:tcPr/>
+                </a:tc>
+                <a:tc>
+                  <a:txBody>
+                    <a:bodyPr/>
+                    <a:lstStyle/>
+                    <a:p>
+                      <a:r>
+                        <a:rPr lang="en-US" sz="4000" dirty="0"/>
+                        <a:t>0.93</a:t>
+                      </a:r>
+                      <a:endParaRPr lang="en-GB" sz="4000" dirty="0"/>
+                    </a:p>
+                  </a:txBody>
+                  <a:tcPr/>
+                </a:tc>
+                <a:tc>
+                  <a:txBody>
+                    <a:bodyPr/>
+                    <a:lstStyle/>
+                    <a:p>
+                      <a:r>
+                        <a:rPr lang="en-US" sz="4000" dirty="0"/>
+                        <a:t>0.39</a:t>
+                      </a:r>
+                      <a:endParaRPr lang="en-GB" sz="4000" dirty="0"/>
+                    </a:p>
+                  </a:txBody>
+                  <a:tcPr/>
+                </a:tc>
+                <a:extLst>
+                  <a:ext uri="{0D108BD9-81ED-4DB2-BD59-A6C34878D82A}">
+                    <a16:rowId xmlns:a16="http://schemas.microsoft.com/office/drawing/2014/main" val="920942807"/>
+                  </a:ext>
+                </a:extLst>
+              </a:tr>
+              <a:tr h="699247">
+                <a:tc>
+                  <a:txBody>
+                    <a:bodyPr/>
+                    <a:lstStyle/>
+                    <a:p>
+                      <a:r>
+                        <a:rPr lang="en-US" sz="4000" dirty="0"/>
+                        <a:t>KNN</a:t>
+                      </a:r>
+                      <a:endParaRPr lang="en-GB" sz="4000" dirty="0"/>
+                    </a:p>
+                  </a:txBody>
+                  <a:tcPr/>
+                </a:tc>
+                <a:tc>
+                  <a:txBody>
+                    <a:bodyPr/>
+                    <a:lstStyle/>
+                    <a:p>
+                      <a:r>
+                        <a:rPr lang="en-US" sz="4000" dirty="0"/>
+                        <a:t>0.21</a:t>
+                      </a:r>
+                      <a:endParaRPr lang="en-GB" sz="4000" dirty="0"/>
+                    </a:p>
+                  </a:txBody>
+                  <a:tcPr/>
+                </a:tc>
+                <a:tc>
+                  <a:txBody>
+                    <a:bodyPr/>
+                    <a:lstStyle/>
+                    <a:p>
+                      <a:r>
+                        <a:rPr lang="en-US" sz="4000" dirty="0"/>
+                        <a:t>0.87</a:t>
+                      </a:r>
+                      <a:endParaRPr lang="en-GB" sz="4000" dirty="0"/>
+                    </a:p>
+                  </a:txBody>
+                  <a:tcPr/>
+                </a:tc>
+                <a:tc>
+                  <a:txBody>
+                    <a:bodyPr/>
+                    <a:lstStyle/>
+                    <a:p>
+                      <a:r>
+                        <a:rPr lang="en-US" sz="4000" dirty="0"/>
+                        <a:t>0.46</a:t>
+                      </a:r>
+                      <a:endParaRPr lang="en-GB" sz="4000" dirty="0"/>
+                    </a:p>
+                  </a:txBody>
+                  <a:tcPr/>
+                </a:tc>
+                <a:extLst>
+                  <a:ext uri="{0D108BD9-81ED-4DB2-BD59-A6C34878D82A}">
+                    <a16:rowId xmlns:a16="http://schemas.microsoft.com/office/drawing/2014/main" val="2941286142"/>
+                  </a:ext>
+                </a:extLst>
+              </a:tr>
+              <a:tr h="370840">
+                <a:tc>
+                  <a:txBody>
+                    <a:bodyPr/>
+                    <a:lstStyle/>
+                    <a:p>
+                      <a:r>
+                        <a:rPr lang="en-US" sz="4000" dirty="0"/>
+                        <a:t>K-Means</a:t>
+                      </a:r>
+                      <a:endParaRPr lang="en-GB" sz="4000" dirty="0"/>
+                    </a:p>
+                  </a:txBody>
+                  <a:tcPr/>
+                </a:tc>
+                <a:tc>
+                  <a:txBody>
+                    <a:bodyPr/>
+                    <a:lstStyle/>
+                    <a:p>
+                      <a:r>
+                        <a:rPr lang="en-US" sz="4000" dirty="0"/>
+                        <a:t>0.25</a:t>
+                      </a:r>
+                      <a:endParaRPr lang="en-GB" sz="4000" dirty="0"/>
+                    </a:p>
+                  </a:txBody>
+                  <a:tcPr/>
+                </a:tc>
+                <a:tc>
+                  <a:txBody>
+                    <a:bodyPr/>
+                    <a:lstStyle/>
+                    <a:p>
+                      <a:r>
+                        <a:rPr lang="en-US" sz="4000" dirty="0"/>
+                        <a:t>0.80</a:t>
+                      </a:r>
+                      <a:endParaRPr lang="en-GB" sz="4000" dirty="0"/>
+                    </a:p>
+                  </a:txBody>
+                  <a:tcPr/>
+                </a:tc>
+                <a:tc>
+                  <a:txBody>
+                    <a:bodyPr/>
+                    <a:lstStyle/>
+                    <a:p>
+                      <a:r>
+                        <a:rPr lang="en-US" sz="4000" dirty="0"/>
+                        <a:t>0.38</a:t>
+                      </a:r>
+                      <a:endParaRPr lang="en-GB" sz="4000" dirty="0"/>
+                    </a:p>
+                  </a:txBody>
+                  <a:tcPr/>
+                </a:tc>
+                <a:extLst>
+                  <a:ext uri="{0D108BD9-81ED-4DB2-BD59-A6C34878D82A}">
+                    <a16:rowId xmlns:a16="http://schemas.microsoft.com/office/drawing/2014/main" val="86799580"/>
+                  </a:ext>
+                </a:extLst>
+              </a:tr>
+            </a:tbl>
+          </a:graphicData>
+        </a:graphic>
+      </p:graphicFrame>
     </p:spTree>
     <p:extLst>
       <p:ext uri="{BB962C8B-B14F-4D97-AF65-F5344CB8AC3E}">

</xml_diff>